<commit_message>
updated Presentation cleaned up the code
</commit_message>
<xml_diff>
--- a/share/presentations/Java 2/RentATool_17.07.2020_Danny.pptx
+++ b/share/presentations/Java 2/RentATool_17.07.2020_Danny.pptx
@@ -8091,6 +8091,44 @@
           </a:p>
         </p:txBody>
       </p:sp>
+      <p:sp>
+        <p:nvSpPr>
+          <p:cNvPr id="2" name="Rechteck 1">
+            <a:extLst>
+              <a:ext uri="{FF2B5EF4-FFF2-40B4-BE49-F238E27FC236}">
+                <a16:creationId xmlns:a16="http://schemas.microsoft.com/office/drawing/2014/main" id="{03E25B9D-FA45-4025-AE68-6B0C51CCCEF8}"/>
+              </a:ext>
+            </a:extLst>
+          </p:cNvPr>
+          <p:cNvSpPr/>
+          <p:nvPr userDrawn="1"/>
+        </p:nvSpPr>
+        <p:spPr>
+          <a:xfrm>
+            <a:off x="4767875" y="6583526"/>
+            <a:ext cx="4477125" cy="261610"/>
+          </a:xfrm>
+          <a:prstGeom prst="rect">
+            <a:avLst/>
+          </a:prstGeom>
+        </p:spPr>
+        <p:txBody>
+          <a:bodyPr wrap="square">
+            <a:spAutoFit/>
+          </a:bodyPr>
+          <a:lstStyle/>
+          <a:p>
+            <a:pPr algn="ctr"/>
+            <a:r>
+              <a:rPr lang="de-DE" sz="1100" dirty="0">
+                <a:hlinkClick r:id="rId4"/>
+              </a:rPr>
+              <a:t>https://github.com/fh-erfurt/RentATool</a:t>
+            </a:r>
+            <a:endParaRPr lang="de-DE" sz="1100" dirty="0"/>
+          </a:p>
+        </p:txBody>
+      </p:sp>
     </p:spTree>
     <p:extLst>
       <p:ext uri="{BB962C8B-B14F-4D97-AF65-F5344CB8AC3E}">
@@ -9425,7 +9463,7 @@
         </p:blipFill>
         <p:spPr>
           <a:xfrm>
-            <a:off x="448734" y="266075"/>
+            <a:off x="448734" y="430262"/>
             <a:ext cx="3119662" cy="1438747"/>
           </a:xfrm>
           <a:prstGeom prst="rect">
@@ -9454,7 +9492,7 @@
         </p:blipFill>
         <p:spPr>
           <a:xfrm>
-            <a:off x="448733" y="1704823"/>
+            <a:off x="448734" y="1869009"/>
             <a:ext cx="3119662" cy="1812404"/>
           </a:xfrm>
           <a:prstGeom prst="rect">
@@ -14225,23 +14263,6 @@
 </file>
 
 <file path=customXml/item1.xml><?xml version="1.0" encoding="utf-8"?>
-<p:properties xmlns:p="http://schemas.microsoft.com/office/2006/metadata/properties" xmlns:xsi="http://www.w3.org/2001/XMLSchema-instance" xmlns:pc="http://schemas.microsoft.com/office/infopath/2007/PartnerControls">
-  <documentManagement>
-    <MediaServiceKeyPoints xmlns="71af3243-3dd4-4a8d-8c0d-dd76da1f02a5" xsi:nil="true"/>
-  </documentManagement>
-</p:properties>
-</file>
-
-<file path=customXml/item2.xml><?xml version="1.0" encoding="utf-8"?>
-<?mso-contentType ?>
-<FormTemplates xmlns="http://schemas.microsoft.com/sharepoint/v3/contenttype/forms">
-  <Display>DocumentLibraryForm</Display>
-  <Edit>DocumentLibraryForm</Edit>
-  <New>DocumentLibraryForm</New>
-</FormTemplates>
-</file>
-
-<file path=customXml/item3.xml><?xml version="1.0" encoding="utf-8"?>
 <ct:contentTypeSchema xmlns:ct="http://schemas.microsoft.com/office/2006/metadata/contentType" xmlns:ma="http://schemas.microsoft.com/office/2006/metadata/properties/metaAttributes" ct:_="" ma:_="" ma:contentTypeName="Document" ma:contentTypeID="0x01010079F111ED35F8CC479449609E8A0923A6" ma:contentTypeVersion="11" ma:contentTypeDescription="Create a new document." ma:contentTypeScope="" ma:versionID="1c2eb7a32e66fb6e4260f3771546a5e2">
   <xsd:schema xmlns:xsd="http://www.w3.org/2001/XMLSchema" xmlns:xs="http://www.w3.org/2001/XMLSchema" xmlns:p="http://schemas.microsoft.com/office/2006/metadata/properties" xmlns:ns2="71af3243-3dd4-4a8d-8c0d-dd76da1f02a5" xmlns:ns3="16c05727-aa75-4e4a-9b5f-8a80a1165891" targetNamespace="http://schemas.microsoft.com/office/2006/metadata/properties" ma:root="true" ma:fieldsID="04e1f6479c48b08974ba73b5ca973489" ns2:_="" ns3:_="">
     <xsd:import namespace="71af3243-3dd4-4a8d-8c0d-dd76da1f02a5"/>
@@ -14452,32 +14473,24 @@
 </ct:contentTypeSchema>
 </file>
 
-<file path=customXml/itemProps1.xml><?xml version="1.0" encoding="utf-8"?>
-<ds:datastoreItem xmlns:ds="http://schemas.openxmlformats.org/officeDocument/2006/customXml" ds:itemID="{30541854-87B3-4953-A183-EF3BD285377B}">
-  <ds:schemaRefs>
-    <ds:schemaRef ds:uri="http://schemas.openxmlformats.org/package/2006/metadata/core-properties"/>
-    <ds:schemaRef ds:uri="http://www.w3.org/XML/1998/namespace"/>
-    <ds:schemaRef ds:uri="http://purl.org/dc/terms/"/>
-    <ds:schemaRef ds:uri="71af3243-3dd4-4a8d-8c0d-dd76da1f02a5"/>
-    <ds:schemaRef ds:uri="16c05727-aa75-4e4a-9b5f-8a80a1165891"/>
-    <ds:schemaRef ds:uri="http://purl.org/dc/dcmitype/"/>
-    <ds:schemaRef ds:uri="http://schemas.microsoft.com/office/2006/documentManagement/types"/>
-    <ds:schemaRef ds:uri="http://schemas.microsoft.com/office/infopath/2007/PartnerControls"/>
-    <ds:schemaRef ds:uri="http://schemas.microsoft.com/office/2006/metadata/properties"/>
-    <ds:schemaRef ds:uri="http://purl.org/dc/elements/1.1/"/>
-  </ds:schemaRefs>
-</ds:datastoreItem>
+<file path=customXml/item2.xml><?xml version="1.0" encoding="utf-8"?>
+<?mso-contentType ?>
+<FormTemplates xmlns="http://schemas.microsoft.com/sharepoint/v3/contenttype/forms">
+  <Display>DocumentLibraryForm</Display>
+  <Edit>DocumentLibraryForm</Edit>
+  <New>DocumentLibraryForm</New>
+</FormTemplates>
 </file>
 
-<file path=customXml/itemProps2.xml><?xml version="1.0" encoding="utf-8"?>
-<ds:datastoreItem xmlns:ds="http://schemas.openxmlformats.org/officeDocument/2006/customXml" ds:itemID="{DFB9BFA2-1FA5-44A1-B975-10D6BF58ECD0}">
-  <ds:schemaRefs>
-    <ds:schemaRef ds:uri="http://schemas.microsoft.com/sharepoint/v3/contenttype/forms"/>
-  </ds:schemaRefs>
-</ds:datastoreItem>
+<file path=customXml/item3.xml><?xml version="1.0" encoding="utf-8"?>
+<p:properties xmlns:p="http://schemas.microsoft.com/office/2006/metadata/properties" xmlns:xsi="http://www.w3.org/2001/XMLSchema-instance" xmlns:pc="http://schemas.microsoft.com/office/infopath/2007/PartnerControls">
+  <documentManagement>
+    <MediaServiceKeyPoints xmlns="71af3243-3dd4-4a8d-8c0d-dd76da1f02a5" xsi:nil="true"/>
+  </documentManagement>
+</p:properties>
 </file>
 
-<file path=customXml/itemProps3.xml><?xml version="1.0" encoding="utf-8"?>
+<file path=customXml/itemProps1.xml><?xml version="1.0" encoding="utf-8"?>
 <ds:datastoreItem xmlns:ds="http://schemas.openxmlformats.org/officeDocument/2006/customXml" ds:itemID="{E577E783-5AB8-45E6-9E56-AE40075231B2}">
   <ds:schemaRefs>
     <ds:schemaRef ds:uri="http://schemas.microsoft.com/office/2006/metadata/contentType"/>
@@ -14494,4 +14507,29 @@
     <ds:schemaRef ds:uri="http://schemas.microsoft.com/internal/obd"/>
   </ds:schemaRefs>
 </ds:datastoreItem>
+</file>
+
+<file path=customXml/itemProps2.xml><?xml version="1.0" encoding="utf-8"?>
+<ds:datastoreItem xmlns:ds="http://schemas.openxmlformats.org/officeDocument/2006/customXml" ds:itemID="{DFB9BFA2-1FA5-44A1-B975-10D6BF58ECD0}">
+  <ds:schemaRefs>
+    <ds:schemaRef ds:uri="http://schemas.microsoft.com/sharepoint/v3/contenttype/forms"/>
+  </ds:schemaRefs>
+</ds:datastoreItem>
+</file>
+
+<file path=customXml/itemProps3.xml><?xml version="1.0" encoding="utf-8"?>
+<ds:datastoreItem xmlns:ds="http://schemas.openxmlformats.org/officeDocument/2006/customXml" ds:itemID="{30541854-87B3-4953-A183-EF3BD285377B}">
+  <ds:schemaRefs>
+    <ds:schemaRef ds:uri="http://schemas.openxmlformats.org/package/2006/metadata/core-properties"/>
+    <ds:schemaRef ds:uri="http://www.w3.org/XML/1998/namespace"/>
+    <ds:schemaRef ds:uri="http://purl.org/dc/terms/"/>
+    <ds:schemaRef ds:uri="71af3243-3dd4-4a8d-8c0d-dd76da1f02a5"/>
+    <ds:schemaRef ds:uri="16c05727-aa75-4e4a-9b5f-8a80a1165891"/>
+    <ds:schemaRef ds:uri="http://purl.org/dc/dcmitype/"/>
+    <ds:schemaRef ds:uri="http://schemas.microsoft.com/office/2006/documentManagement/types"/>
+    <ds:schemaRef ds:uri="http://schemas.microsoft.com/office/infopath/2007/PartnerControls"/>
+    <ds:schemaRef ds:uri="http://schemas.microsoft.com/office/2006/metadata/properties"/>
+    <ds:schemaRef ds:uri="http://purl.org/dc/elements/1.1/"/>
+  </ds:schemaRefs>
+</ds:datastoreItem>
 </file>
</xml_diff>